<commit_message>
Team & Strategy 평가지표 추가
</commit_message>
<xml_diff>
--- a/Team_n_Strategy.pptx
+++ b/Team_n_Strategy.pptx
@@ -5,12 +5,13 @@
     <p:sldMasterId id="2147483736" r:id="rId1"/>
   </p:sldMasterIdLst>
   <p:notesMasterIdLst>
-    <p:notesMasterId r:id="rId5"/>
+    <p:notesMasterId r:id="rId6"/>
   </p:notesMasterIdLst>
   <p:sldIdLst>
     <p:sldId id="262" r:id="rId2"/>
     <p:sldId id="263" r:id="rId3"/>
     <p:sldId id="266" r:id="rId4"/>
+    <p:sldId id="267" r:id="rId5"/>
   </p:sldIdLst>
   <p:sldSz cx="12192000" cy="6858000"/>
   <p:notesSz cx="6858000" cy="9144000"/>
@@ -199,7 +200,7 @@
           <a:p>
             <a:fld id="{9B760AC4-FCF5-4AD1-8954-8BA5C359FC68}" type="datetimeFigureOut">
               <a:rPr lang="ko-KR" altLang="en-US" smtClean="0"/>
-              <a:t>2021-04-01</a:t>
+              <a:t>2021-04-02</a:t>
             </a:fld>
             <a:endParaRPr lang="ko-KR" altLang="en-US"/>
           </a:p>
@@ -971,6 +972,90 @@
 </p:notes>
 </file>
 
+<file path=ppt/notesSlides/notesSlide4.xml><?xml version="1.0" encoding="utf-8"?>
+<p:notes xmlns:a="http://schemas.openxmlformats.org/drawingml/2006/main" xmlns:r="http://schemas.openxmlformats.org/officeDocument/2006/relationships" xmlns:p="http://schemas.openxmlformats.org/presentationml/2006/main">
+  <p:cSld>
+    <p:spTree>
+      <p:nvGrpSpPr>
+        <p:cNvPr id="1" name=""/>
+        <p:cNvGrpSpPr/>
+        <p:nvPr/>
+      </p:nvGrpSpPr>
+      <p:grpSpPr>
+        <a:xfrm>
+          <a:off x="0" y="0"/>
+          <a:ext cx="0" cy="0"/>
+          <a:chOff x="0" y="0"/>
+          <a:chExt cx="0" cy="0"/>
+        </a:xfrm>
+      </p:grpSpPr>
+      <p:sp>
+        <p:nvSpPr>
+          <p:cNvPr id="2" name="슬라이드 이미지 개체 틀 1"/>
+          <p:cNvSpPr>
+            <a:spLocks noGrp="1" noRot="1" noChangeAspect="1"/>
+          </p:cNvSpPr>
+          <p:nvPr>
+            <p:ph type="sldImg"/>
+          </p:nvPr>
+        </p:nvSpPr>
+        <p:spPr/>
+      </p:sp>
+      <p:sp>
+        <p:nvSpPr>
+          <p:cNvPr id="3" name="슬라이드 노트 개체 틀 2"/>
+          <p:cNvSpPr>
+            <a:spLocks noGrp="1"/>
+          </p:cNvSpPr>
+          <p:nvPr>
+            <p:ph type="body" idx="1"/>
+          </p:nvPr>
+        </p:nvSpPr>
+        <p:spPr/>
+        <p:txBody>
+          <a:bodyPr/>
+          <a:lstStyle/>
+          <a:p>
+            <a:endParaRPr lang="ko-KR" altLang="en-US" dirty="0"/>
+          </a:p>
+        </p:txBody>
+      </p:sp>
+      <p:sp>
+        <p:nvSpPr>
+          <p:cNvPr id="4" name="슬라이드 번호 개체 틀 3"/>
+          <p:cNvSpPr>
+            <a:spLocks noGrp="1"/>
+          </p:cNvSpPr>
+          <p:nvPr>
+            <p:ph type="sldNum" sz="quarter" idx="5"/>
+          </p:nvPr>
+        </p:nvSpPr>
+        <p:spPr/>
+        <p:txBody>
+          <a:bodyPr/>
+          <a:lstStyle/>
+          <a:p>
+            <a:fld id="{744A4A5E-C2AB-43D7-8948-31DC37C34E3F}" type="slidenum">
+              <a:rPr lang="ko-KR" altLang="en-US" smtClean="0"/>
+              <a:t>4</a:t>
+            </a:fld>
+            <a:endParaRPr lang="ko-KR" altLang="en-US"/>
+          </a:p>
+        </p:txBody>
+      </p:sp>
+    </p:spTree>
+    <p:extLst>
+      <p:ext uri="{BB962C8B-B14F-4D97-AF65-F5344CB8AC3E}">
+        <p14:creationId xmlns:p14="http://schemas.microsoft.com/office/powerpoint/2010/main" val="2869861027"/>
+      </p:ext>
+    </p:extLst>
+  </p:cSld>
+  <p:clrMapOvr>
+    <a:masterClrMapping/>
+  </p:clrMapOvr>
+</p:notes>
+</file>
+
 <file path=ppt/slideLayouts/slideLayout1.xml><?xml version="1.0" encoding="utf-8"?>
 <p:sldLayout xmlns:a="http://schemas.openxmlformats.org/drawingml/2006/main" xmlns:r="http://schemas.openxmlformats.org/officeDocument/2006/relationships" xmlns:p="http://schemas.openxmlformats.org/presentationml/2006/main" type="title" preserve="1">
   <p:cSld name="Title Slide">
@@ -3316,7 +3401,7 @@
           <a:p>
             <a:fld id="{3C04E684-10F4-4CC3-A0B9-F03AA7BE37CF}" type="datetimeFigureOut">
               <a:rPr lang="en-US" smtClean="0"/>
-              <a:t>4/1/2021</a:t>
+              <a:t>4/2/2021</a:t>
             </a:fld>
             <a:endParaRPr lang="en-US"/>
           </a:p>
@@ -5806,7 +5891,7 @@
           <a:p>
             <a:fld id="{3C04E684-10F4-4CC3-A0B9-F03AA7BE37CF}" type="datetimeFigureOut">
               <a:rPr lang="en-US" smtClean="0"/>
-              <a:t>4/1/2021</a:t>
+              <a:t>4/2/2021</a:t>
             </a:fld>
             <a:endParaRPr lang="en-US"/>
           </a:p>
@@ -6004,7 +6089,7 @@
           <a:p>
             <a:fld id="{3C04E684-10F4-4CC3-A0B9-F03AA7BE37CF}" type="datetimeFigureOut">
               <a:rPr lang="en-US" smtClean="0"/>
-              <a:t>4/1/2021</a:t>
+              <a:t>4/2/2021</a:t>
             </a:fld>
             <a:endParaRPr lang="en-US"/>
           </a:p>
@@ -6212,7 +6297,7 @@
           <a:p>
             <a:fld id="{3C04E684-10F4-4CC3-A0B9-F03AA7BE37CF}" type="datetimeFigureOut">
               <a:rPr lang="en-US" smtClean="0"/>
-              <a:t>4/1/2021</a:t>
+              <a:t>4/2/2021</a:t>
             </a:fld>
             <a:endParaRPr lang="en-US"/>
           </a:p>
@@ -6949,7 +7034,7 @@
           <a:p>
             <a:fld id="{3C04E684-10F4-4CC3-A0B9-F03AA7BE37CF}" type="datetimeFigureOut">
               <a:rPr lang="en-US" smtClean="0"/>
-              <a:t>4/1/2021</a:t>
+              <a:t>4/2/2021</a:t>
             </a:fld>
             <a:endParaRPr lang="en-US"/>
           </a:p>
@@ -7591,7 +7676,7 @@
           <a:p>
             <a:fld id="{3C04E684-10F4-4CC3-A0B9-F03AA7BE37CF}" type="datetimeFigureOut">
               <a:rPr lang="en-US" smtClean="0"/>
-              <a:t>4/1/2021</a:t>
+              <a:t>4/2/2021</a:t>
             </a:fld>
             <a:endParaRPr lang="en-US"/>
           </a:p>
@@ -8391,7 +8476,7 @@
           <a:p>
             <a:fld id="{3C04E684-10F4-4CC3-A0B9-F03AA7BE37CF}" type="datetimeFigureOut">
               <a:rPr lang="en-US" smtClean="0"/>
-              <a:t>4/1/2021</a:t>
+              <a:t>4/2/2021</a:t>
             </a:fld>
             <a:endParaRPr lang="en-US"/>
           </a:p>
@@ -9342,7 +9427,7 @@
           <a:p>
             <a:fld id="{3C04E684-10F4-4CC3-A0B9-F03AA7BE37CF}" type="datetimeFigureOut">
               <a:rPr lang="en-US" smtClean="0"/>
-              <a:t>4/1/2021</a:t>
+              <a:t>4/2/2021</a:t>
             </a:fld>
             <a:endParaRPr lang="en-US"/>
           </a:p>
@@ -11691,7 +11776,7 @@
           <a:p>
             <a:fld id="{3C04E684-10F4-4CC3-A0B9-F03AA7BE37CF}" type="datetimeFigureOut">
               <a:rPr lang="en-US" smtClean="0"/>
-              <a:t>4/1/2021</a:t>
+              <a:t>4/2/2021</a:t>
             </a:fld>
             <a:endParaRPr lang="en-US"/>
           </a:p>
@@ -11804,7 +11889,7 @@
           <a:p>
             <a:fld id="{3C04E684-10F4-4CC3-A0B9-F03AA7BE37CF}" type="datetimeFigureOut">
               <a:rPr lang="en-US" smtClean="0"/>
-              <a:t>4/1/2021</a:t>
+              <a:t>4/2/2021</a:t>
             </a:fld>
             <a:endParaRPr lang="en-US"/>
           </a:p>
@@ -12311,7 +12396,7 @@
           <a:p>
             <a:fld id="{3C04E684-10F4-4CC3-A0B9-F03AA7BE37CF}" type="datetimeFigureOut">
               <a:rPr lang="en-US" smtClean="0"/>
-              <a:t>4/1/2021</a:t>
+              <a:t>4/2/2021</a:t>
             </a:fld>
             <a:endParaRPr lang="en-US"/>
           </a:p>
@@ -13614,7 +13699,7 @@
           <a:p>
             <a:fld id="{3C04E684-10F4-4CC3-A0B9-F03AA7BE37CF}" type="datetimeFigureOut">
               <a:rPr lang="en-US" smtClean="0"/>
-              <a:t>4/1/2021</a:t>
+              <a:t>4/2/2021</a:t>
             </a:fld>
             <a:endParaRPr lang="en-US"/>
           </a:p>
@@ -13857,7 +13942,7 @@
           <a:p>
             <a:fld id="{3C04E684-10F4-4CC3-A0B9-F03AA7BE37CF}" type="datetimeFigureOut">
               <a:rPr lang="en-US" smtClean="0"/>
-              <a:t>4/1/2021</a:t>
+              <a:t>4/2/2021</a:t>
             </a:fld>
             <a:endParaRPr lang="en-US"/>
           </a:p>
@@ -15402,14 +15487,14 @@
             <a:r>
               <a:rPr lang="en-US" altLang="ko-KR" sz="2400" dirty="0">
                 <a:solidFill>
-                  <a:schemeClr val="tx1"/>
+                  <a:schemeClr val="bg1"/>
                 </a:solidFill>
               </a:rPr>
               <a:t>Acceptance testing</a:t>
             </a:r>
             <a:endParaRPr lang="ko-KR" altLang="en-US" sz="2400" dirty="0">
               <a:solidFill>
-                <a:schemeClr val="tx1"/>
+                <a:schemeClr val="bg1"/>
               </a:solidFill>
             </a:endParaRPr>
           </a:p>
@@ -15460,14 +15545,14 @@
             <a:r>
               <a:rPr lang="en-US" altLang="ko-KR" sz="2400" dirty="0">
                 <a:solidFill>
-                  <a:schemeClr val="tx1"/>
+                  <a:schemeClr val="bg1"/>
                 </a:solidFill>
               </a:rPr>
               <a:t>Component testing</a:t>
             </a:r>
             <a:endParaRPr lang="ko-KR" altLang="en-US" sz="2400" dirty="0">
               <a:solidFill>
-                <a:schemeClr val="tx1"/>
+                <a:schemeClr val="bg1"/>
               </a:solidFill>
             </a:endParaRPr>
           </a:p>
@@ -15518,14 +15603,14 @@
             <a:r>
               <a:rPr lang="en-US" altLang="ko-KR" sz="2400" dirty="0">
                 <a:solidFill>
-                  <a:schemeClr val="tx1"/>
+                  <a:schemeClr val="bg1"/>
                 </a:solidFill>
               </a:rPr>
               <a:t>System testing</a:t>
             </a:r>
             <a:endParaRPr lang="ko-KR" altLang="en-US" sz="2400" dirty="0">
               <a:solidFill>
-                <a:schemeClr val="tx1"/>
+                <a:schemeClr val="bg1"/>
               </a:solidFill>
             </a:endParaRPr>
           </a:p>
@@ -15627,6 +15712,559 @@
     <p:extLst>
       <p:ext uri="{BB962C8B-B14F-4D97-AF65-F5344CB8AC3E}">
         <p14:creationId xmlns:p14="http://schemas.microsoft.com/office/powerpoint/2010/main" val="1651784002"/>
+      </p:ext>
+    </p:extLst>
+  </p:cSld>
+  <p:clrMapOvr>
+    <a:masterClrMapping/>
+  </p:clrMapOvr>
+</p:sld>
+</file>
+
+<file path=ppt/slides/slide4.xml><?xml version="1.0" encoding="utf-8"?>
+<p:sld xmlns:a="http://schemas.openxmlformats.org/drawingml/2006/main" xmlns:r="http://schemas.openxmlformats.org/officeDocument/2006/relationships" xmlns:p="http://schemas.openxmlformats.org/presentationml/2006/main">
+  <p:cSld>
+    <p:spTree>
+      <p:nvGrpSpPr>
+        <p:cNvPr id="1" name=""/>
+        <p:cNvGrpSpPr/>
+        <p:nvPr/>
+      </p:nvGrpSpPr>
+      <p:grpSpPr>
+        <a:xfrm>
+          <a:off x="0" y="0"/>
+          <a:ext cx="0" cy="0"/>
+          <a:chOff x="0" y="0"/>
+          <a:chExt cx="0" cy="0"/>
+        </a:xfrm>
+      </p:grpSpPr>
+      <p:sp>
+        <p:nvSpPr>
+          <p:cNvPr id="3" name="제목 2">
+            <a:extLst>
+              <a:ext uri="{FF2B5EF4-FFF2-40B4-BE49-F238E27FC236}">
+                <a16:creationId xmlns:a16="http://schemas.microsoft.com/office/drawing/2014/main" id="{21C19F7A-5B61-4C67-88A2-F3BD1D46C1A5}"/>
+              </a:ext>
+            </a:extLst>
+          </p:cNvPr>
+          <p:cNvSpPr>
+            <a:spLocks noGrp="1"/>
+          </p:cNvSpPr>
+          <p:nvPr>
+            <p:ph type="title"/>
+          </p:nvPr>
+        </p:nvSpPr>
+        <p:spPr/>
+        <p:txBody>
+          <a:bodyPr/>
+          <a:lstStyle/>
+          <a:p>
+            <a:r>
+              <a:rPr lang="en-US" altLang="ko-KR" dirty="0"/>
+              <a:t>Team &amp; Strategy </a:t>
+            </a:r>
+            <a:r>
+              <a:rPr lang="en-US" altLang="ko-KR" sz="3200" b="0" dirty="0"/>
+              <a:t>– Quantitative evaluation</a:t>
+            </a:r>
+            <a:endParaRPr lang="ko-KR" altLang="en-US" b="0" dirty="0"/>
+          </a:p>
+        </p:txBody>
+      </p:sp>
+      <p:graphicFrame>
+        <p:nvGraphicFramePr>
+          <p:cNvPr id="8" name="표 7">
+            <a:extLst>
+              <a:ext uri="{FF2B5EF4-FFF2-40B4-BE49-F238E27FC236}">
+                <a16:creationId xmlns:a16="http://schemas.microsoft.com/office/drawing/2014/main" id="{4B162875-A4E3-479C-9329-444FB32AFE59}"/>
+              </a:ext>
+            </a:extLst>
+          </p:cNvPr>
+          <p:cNvGraphicFramePr>
+            <a:graphicFrameLocks noGrp="1"/>
+          </p:cNvGraphicFramePr>
+          <p:nvPr>
+            <p:ph idx="1"/>
+            <p:extLst>
+              <p:ext uri="{D42A27DB-BD31-4B8C-83A1-F6EECF244321}">
+                <p14:modId xmlns:p14="http://schemas.microsoft.com/office/powerpoint/2010/main" val="1166088261"/>
+              </p:ext>
+            </p:extLst>
+          </p:nvPr>
+        </p:nvGraphicFramePr>
+        <p:xfrm>
+          <a:off x="838200" y="1535504"/>
+          <a:ext cx="10515600" cy="4938579"/>
+        </p:xfrm>
+        <a:graphic>
+          <a:graphicData uri="http://schemas.openxmlformats.org/drawingml/2006/table">
+            <a:tbl>
+              <a:tblPr firstRow="1" bandRow="1">
+                <a:tableStyleId>{5C22544A-7EE6-4342-B048-85BDC9FD1C3A}</a:tableStyleId>
+              </a:tblPr>
+              <a:tblGrid>
+                <a:gridCol w="7010400">
+                  <a:extLst>
+                    <a:ext uri="{9D8B030D-6E8A-4147-A177-3AD203B41FA5}">
+                      <a16:colId xmlns:a16="http://schemas.microsoft.com/office/drawing/2014/main" val="4013395097"/>
+                    </a:ext>
+                  </a:extLst>
+                </a:gridCol>
+                <a:gridCol w="1752600">
+                  <a:extLst>
+                    <a:ext uri="{9D8B030D-6E8A-4147-A177-3AD203B41FA5}">
+                      <a16:colId xmlns:a16="http://schemas.microsoft.com/office/drawing/2014/main" val="289483170"/>
+                    </a:ext>
+                  </a:extLst>
+                </a:gridCol>
+                <a:gridCol w="1752600">
+                  <a:extLst>
+                    <a:ext uri="{9D8B030D-6E8A-4147-A177-3AD203B41FA5}">
+                      <a16:colId xmlns:a16="http://schemas.microsoft.com/office/drawing/2014/main" val="219788569"/>
+                    </a:ext>
+                  </a:extLst>
+                </a:gridCol>
+              </a:tblGrid>
+              <a:tr h="548731">
+                <a:tc>
+                  <a:txBody>
+                    <a:bodyPr/>
+                    <a:lstStyle/>
+                    <a:p>
+                      <a:pPr algn="ctr" latinLnBrk="1"/>
+                      <a:r>
+                        <a:rPr lang="en-US" altLang="ko-KR" dirty="0"/>
+                        <a:t>Evaluation indicator</a:t>
+                      </a:r>
+                      <a:endParaRPr lang="ko-KR" altLang="en-US" dirty="0"/>
+                    </a:p>
+                  </a:txBody>
+                  <a:tcPr anchor="ctr"/>
+                </a:tc>
+                <a:tc>
+                  <a:txBody>
+                    <a:bodyPr/>
+                    <a:lstStyle/>
+                    <a:p>
+                      <a:pPr algn="ctr" latinLnBrk="1"/>
+                      <a:r>
+                        <a:rPr lang="en-US" altLang="ko-KR" dirty="0"/>
+                        <a:t>Quantitative</a:t>
+                      </a:r>
+                      <a:endParaRPr lang="ko-KR" altLang="en-US" dirty="0"/>
+                    </a:p>
+                  </a:txBody>
+                  <a:tcPr anchor="ctr"/>
+                </a:tc>
+                <a:tc>
+                  <a:txBody>
+                    <a:bodyPr/>
+                    <a:lstStyle/>
+                    <a:p>
+                      <a:pPr algn="ctr" latinLnBrk="1"/>
+                      <a:r>
+                        <a:rPr lang="en-US" altLang="ko-KR" dirty="0"/>
+                        <a:t>Importance</a:t>
+                      </a:r>
+                      <a:endParaRPr lang="ko-KR" altLang="en-US" dirty="0"/>
+                    </a:p>
+                  </a:txBody>
+                  <a:tcPr anchor="ctr"/>
+                </a:tc>
+                <a:extLst>
+                  <a:ext uri="{0D108BD9-81ED-4DB2-BD59-A6C34878D82A}">
+                    <a16:rowId xmlns:a16="http://schemas.microsoft.com/office/drawing/2014/main" val="2461258313"/>
+                  </a:ext>
+                </a:extLst>
+              </a:tr>
+              <a:tr h="548731">
+                <a:tc>
+                  <a:txBody>
+                    <a:bodyPr/>
+                    <a:lstStyle/>
+                    <a:p>
+                      <a:pPr algn="ctr" latinLnBrk="1"/>
+                      <a:r>
+                        <a:rPr lang="en-US" altLang="ko-KR" dirty="0"/>
+                        <a:t>Accuracy testing to check algorithm really shows real shortcut</a:t>
+                      </a:r>
+                      <a:endParaRPr lang="ko-KR" altLang="en-US" dirty="0"/>
+                    </a:p>
+                  </a:txBody>
+                  <a:tcPr anchor="ctr"/>
+                </a:tc>
+                <a:tc>
+                  <a:txBody>
+                    <a:bodyPr/>
+                    <a:lstStyle/>
+                    <a:p>
+                      <a:pPr algn="ctr" latinLnBrk="1"/>
+                      <a:r>
+                        <a:rPr lang="en-US" altLang="ko-KR" dirty="0"/>
+                        <a:t>95%↑</a:t>
+                      </a:r>
+                      <a:endParaRPr lang="ko-KR" altLang="en-US" dirty="0"/>
+                    </a:p>
+                  </a:txBody>
+                  <a:tcPr anchor="ctr"/>
+                </a:tc>
+                <a:tc>
+                  <a:txBody>
+                    <a:bodyPr/>
+                    <a:lstStyle/>
+                    <a:p>
+                      <a:pPr algn="ctr" latinLnBrk="1"/>
+                      <a:r>
+                        <a:rPr lang="en-US" altLang="ko-KR" dirty="0"/>
+                        <a:t>20%</a:t>
+                      </a:r>
+                      <a:endParaRPr lang="ko-KR" altLang="en-US" dirty="0"/>
+                    </a:p>
+                  </a:txBody>
+                  <a:tcPr anchor="ctr"/>
+                </a:tc>
+                <a:extLst>
+                  <a:ext uri="{0D108BD9-81ED-4DB2-BD59-A6C34878D82A}">
+                    <a16:rowId xmlns:a16="http://schemas.microsoft.com/office/drawing/2014/main" val="1624731853"/>
+                  </a:ext>
+                </a:extLst>
+              </a:tr>
+              <a:tr h="548731">
+                <a:tc>
+                  <a:txBody>
+                    <a:bodyPr/>
+                    <a:lstStyle/>
+                    <a:p>
+                      <a:pPr algn="ctr" latinLnBrk="1"/>
+                      <a:r>
+                        <a:rPr lang="en-US" altLang="ko-KR" dirty="0"/>
+                        <a:t>Collection rate of building inside view data</a:t>
+                      </a:r>
+                      <a:endParaRPr lang="ko-KR" altLang="en-US" dirty="0"/>
+                    </a:p>
+                  </a:txBody>
+                  <a:tcPr anchor="ctr"/>
+                </a:tc>
+                <a:tc>
+                  <a:txBody>
+                    <a:bodyPr/>
+                    <a:lstStyle/>
+                    <a:p>
+                      <a:pPr algn="ctr" latinLnBrk="1"/>
+                      <a:r>
+                        <a:rPr lang="en-US" altLang="ko-KR" dirty="0"/>
+                        <a:t>98%↑</a:t>
+                      </a:r>
+                      <a:endParaRPr lang="ko-KR" altLang="en-US" dirty="0"/>
+                    </a:p>
+                  </a:txBody>
+                  <a:tcPr anchor="ctr"/>
+                </a:tc>
+                <a:tc>
+                  <a:txBody>
+                    <a:bodyPr/>
+                    <a:lstStyle/>
+                    <a:p>
+                      <a:pPr algn="ctr" latinLnBrk="1"/>
+                      <a:r>
+                        <a:rPr lang="en-US" altLang="ko-KR" dirty="0"/>
+                        <a:t>25%</a:t>
+                      </a:r>
+                      <a:endParaRPr lang="ko-KR" altLang="en-US" dirty="0"/>
+                    </a:p>
+                  </a:txBody>
+                  <a:tcPr anchor="ctr"/>
+                </a:tc>
+                <a:extLst>
+                  <a:ext uri="{0D108BD9-81ED-4DB2-BD59-A6C34878D82A}">
+                    <a16:rowId xmlns:a16="http://schemas.microsoft.com/office/drawing/2014/main" val="3709917705"/>
+                  </a:ext>
+                </a:extLst>
+              </a:tr>
+              <a:tr h="548731">
+                <a:tc>
+                  <a:txBody>
+                    <a:bodyPr/>
+                    <a:lstStyle/>
+                    <a:p>
+                      <a:pPr algn="ctr" latinLnBrk="1"/>
+                      <a:r>
+                        <a:rPr lang="en-US" altLang="ko-KR" dirty="0"/>
+                        <a:t>UI / UX user evaluation</a:t>
+                      </a:r>
+                      <a:endParaRPr lang="ko-KR" altLang="en-US" dirty="0"/>
+                    </a:p>
+                  </a:txBody>
+                  <a:tcPr anchor="ctr"/>
+                </a:tc>
+                <a:tc>
+                  <a:txBody>
+                    <a:bodyPr/>
+                    <a:lstStyle/>
+                    <a:p>
+                      <a:pPr algn="ctr" latinLnBrk="1"/>
+                      <a:r>
+                        <a:rPr lang="en-US" altLang="ko-KR" dirty="0"/>
+                        <a:t>85%↑</a:t>
+                      </a:r>
+                      <a:endParaRPr lang="ko-KR" altLang="en-US" dirty="0"/>
+                    </a:p>
+                  </a:txBody>
+                  <a:tcPr anchor="ctr"/>
+                </a:tc>
+                <a:tc>
+                  <a:txBody>
+                    <a:bodyPr/>
+                    <a:lstStyle/>
+                    <a:p>
+                      <a:pPr algn="ctr" latinLnBrk="1"/>
+                      <a:r>
+                        <a:rPr lang="en-US" altLang="ko-KR" dirty="0"/>
+                        <a:t>20%</a:t>
+                      </a:r>
+                      <a:endParaRPr lang="ko-KR" altLang="en-US" dirty="0"/>
+                    </a:p>
+                  </a:txBody>
+                  <a:tcPr anchor="ctr"/>
+                </a:tc>
+                <a:extLst>
+                  <a:ext uri="{0D108BD9-81ED-4DB2-BD59-A6C34878D82A}">
+                    <a16:rowId xmlns:a16="http://schemas.microsoft.com/office/drawing/2014/main" val="885778179"/>
+                  </a:ext>
+                </a:extLst>
+              </a:tr>
+              <a:tr h="548731">
+                <a:tc>
+                  <a:txBody>
+                    <a:bodyPr/>
+                    <a:lstStyle/>
+                    <a:p>
+                      <a:pPr algn="ctr" latinLnBrk="1"/>
+                      <a:r>
+                        <a:rPr lang="en-US" altLang="ko-KR" dirty="0"/>
+                        <a:t>Shortcut path search speed</a:t>
+                      </a:r>
+                      <a:endParaRPr lang="ko-KR" altLang="en-US" dirty="0"/>
+                    </a:p>
+                  </a:txBody>
+                  <a:tcPr anchor="ctr"/>
+                </a:tc>
+                <a:tc>
+                  <a:txBody>
+                    <a:bodyPr/>
+                    <a:lstStyle/>
+                    <a:p>
+                      <a:pPr algn="ctr" latinLnBrk="1"/>
+                      <a:r>
+                        <a:rPr lang="en-US" altLang="ko-KR" dirty="0"/>
+                        <a:t>3 Sec↓</a:t>
+                      </a:r>
+                      <a:endParaRPr lang="ko-KR" altLang="en-US" dirty="0"/>
+                    </a:p>
+                  </a:txBody>
+                  <a:tcPr anchor="ctr"/>
+                </a:tc>
+                <a:tc>
+                  <a:txBody>
+                    <a:bodyPr/>
+                    <a:lstStyle/>
+                    <a:p>
+                      <a:pPr algn="ctr" latinLnBrk="1"/>
+                      <a:r>
+                        <a:rPr lang="en-US" altLang="ko-KR" dirty="0"/>
+                        <a:t>20%</a:t>
+                      </a:r>
+                      <a:endParaRPr lang="ko-KR" altLang="en-US" dirty="0"/>
+                    </a:p>
+                  </a:txBody>
+                  <a:tcPr anchor="ctr"/>
+                </a:tc>
+                <a:extLst>
+                  <a:ext uri="{0D108BD9-81ED-4DB2-BD59-A6C34878D82A}">
+                    <a16:rowId xmlns:a16="http://schemas.microsoft.com/office/drawing/2014/main" val="3768163880"/>
+                  </a:ext>
+                </a:extLst>
+              </a:tr>
+              <a:tr h="548731">
+                <a:tc>
+                  <a:txBody>
+                    <a:bodyPr/>
+                    <a:lstStyle/>
+                    <a:p>
+                      <a:pPr algn="ctr" latinLnBrk="1"/>
+                      <a:r>
+                        <a:rPr lang="en-US" altLang="ko-KR" dirty="0"/>
+                        <a:t>Accuracy of time duration through path</a:t>
+                      </a:r>
+                      <a:endParaRPr lang="ko-KR" altLang="en-US" dirty="0"/>
+                    </a:p>
+                  </a:txBody>
+                  <a:tcPr anchor="ctr"/>
+                </a:tc>
+                <a:tc>
+                  <a:txBody>
+                    <a:bodyPr/>
+                    <a:lstStyle/>
+                    <a:p>
+                      <a:pPr algn="ctr" latinLnBrk="1"/>
+                      <a:r>
+                        <a:rPr lang="en-US" altLang="ko-KR" dirty="0"/>
+                        <a:t>90%↑</a:t>
+                      </a:r>
+                      <a:endParaRPr lang="ko-KR" altLang="en-US" dirty="0"/>
+                    </a:p>
+                  </a:txBody>
+                  <a:tcPr anchor="ctr"/>
+                </a:tc>
+                <a:tc>
+                  <a:txBody>
+                    <a:bodyPr/>
+                    <a:lstStyle/>
+                    <a:p>
+                      <a:pPr algn="ctr" latinLnBrk="1"/>
+                      <a:r>
+                        <a:rPr lang="en-US" altLang="ko-KR" dirty="0"/>
+                        <a:t>15%</a:t>
+                      </a:r>
+                      <a:endParaRPr lang="ko-KR" altLang="en-US" dirty="0"/>
+                    </a:p>
+                  </a:txBody>
+                  <a:tcPr anchor="ctr"/>
+                </a:tc>
+                <a:extLst>
+                  <a:ext uri="{0D108BD9-81ED-4DB2-BD59-A6C34878D82A}">
+                    <a16:rowId xmlns:a16="http://schemas.microsoft.com/office/drawing/2014/main" val="1272447345"/>
+                  </a:ext>
+                </a:extLst>
+              </a:tr>
+              <a:tr h="548731">
+                <a:tc>
+                  <a:txBody>
+                    <a:bodyPr/>
+                    <a:lstStyle/>
+                    <a:p>
+                      <a:pPr algn="ctr" latinLnBrk="1"/>
+                      <a:endParaRPr lang="ko-KR" altLang="en-US" dirty="0"/>
+                    </a:p>
+                  </a:txBody>
+                  <a:tcPr anchor="ctr"/>
+                </a:tc>
+                <a:tc>
+                  <a:txBody>
+                    <a:bodyPr/>
+                    <a:lstStyle/>
+                    <a:p>
+                      <a:pPr algn="ctr" latinLnBrk="1"/>
+                      <a:endParaRPr lang="ko-KR" altLang="en-US" dirty="0"/>
+                    </a:p>
+                  </a:txBody>
+                  <a:tcPr anchor="ctr"/>
+                </a:tc>
+                <a:tc>
+                  <a:txBody>
+                    <a:bodyPr/>
+                    <a:lstStyle/>
+                    <a:p>
+                      <a:pPr algn="ctr" latinLnBrk="1"/>
+                      <a:endParaRPr lang="ko-KR" altLang="en-US" dirty="0"/>
+                    </a:p>
+                  </a:txBody>
+                  <a:tcPr anchor="ctr"/>
+                </a:tc>
+                <a:extLst>
+                  <a:ext uri="{0D108BD9-81ED-4DB2-BD59-A6C34878D82A}">
+                    <a16:rowId xmlns:a16="http://schemas.microsoft.com/office/drawing/2014/main" val="565131917"/>
+                  </a:ext>
+                </a:extLst>
+              </a:tr>
+              <a:tr h="548731">
+                <a:tc>
+                  <a:txBody>
+                    <a:bodyPr/>
+                    <a:lstStyle/>
+                    <a:p>
+                      <a:pPr algn="ctr" latinLnBrk="1"/>
+                      <a:endParaRPr lang="ko-KR" altLang="en-US" dirty="0"/>
+                    </a:p>
+                  </a:txBody>
+                  <a:tcPr anchor="ctr"/>
+                </a:tc>
+                <a:tc>
+                  <a:txBody>
+                    <a:bodyPr/>
+                    <a:lstStyle/>
+                    <a:p>
+                      <a:pPr algn="ctr" latinLnBrk="1"/>
+                      <a:endParaRPr lang="ko-KR" altLang="en-US" dirty="0"/>
+                    </a:p>
+                  </a:txBody>
+                  <a:tcPr anchor="ctr"/>
+                </a:tc>
+                <a:tc>
+                  <a:txBody>
+                    <a:bodyPr/>
+                    <a:lstStyle/>
+                    <a:p>
+                      <a:pPr algn="ctr" latinLnBrk="1"/>
+                      <a:endParaRPr lang="ko-KR" altLang="en-US" dirty="0"/>
+                    </a:p>
+                  </a:txBody>
+                  <a:tcPr anchor="ctr"/>
+                </a:tc>
+                <a:extLst>
+                  <a:ext uri="{0D108BD9-81ED-4DB2-BD59-A6C34878D82A}">
+                    <a16:rowId xmlns:a16="http://schemas.microsoft.com/office/drawing/2014/main" val="2615356161"/>
+                  </a:ext>
+                </a:extLst>
+              </a:tr>
+              <a:tr h="548731">
+                <a:tc>
+                  <a:txBody>
+                    <a:bodyPr/>
+                    <a:lstStyle/>
+                    <a:p>
+                      <a:pPr algn="ctr" latinLnBrk="1"/>
+                      <a:endParaRPr lang="ko-KR" altLang="en-US" dirty="0"/>
+                    </a:p>
+                  </a:txBody>
+                  <a:tcPr anchor="ctr"/>
+                </a:tc>
+                <a:tc>
+                  <a:txBody>
+                    <a:bodyPr/>
+                    <a:lstStyle/>
+                    <a:p>
+                      <a:pPr algn="ctr" latinLnBrk="1"/>
+                      <a:endParaRPr lang="ko-KR" altLang="en-US" dirty="0"/>
+                    </a:p>
+                  </a:txBody>
+                  <a:tcPr anchor="ctr"/>
+                </a:tc>
+                <a:tc>
+                  <a:txBody>
+                    <a:bodyPr/>
+                    <a:lstStyle/>
+                    <a:p>
+                      <a:pPr algn="ctr" latinLnBrk="1"/>
+                      <a:endParaRPr lang="ko-KR" altLang="en-US" dirty="0"/>
+                    </a:p>
+                  </a:txBody>
+                  <a:tcPr anchor="ctr"/>
+                </a:tc>
+                <a:extLst>
+                  <a:ext uri="{0D108BD9-81ED-4DB2-BD59-A6C34878D82A}">
+                    <a16:rowId xmlns:a16="http://schemas.microsoft.com/office/drawing/2014/main" val="624180639"/>
+                  </a:ext>
+                </a:extLst>
+              </a:tr>
+            </a:tbl>
+          </a:graphicData>
+        </a:graphic>
+      </p:graphicFrame>
+    </p:spTree>
+    <p:extLst>
+      <p:ext uri="{BB962C8B-B14F-4D97-AF65-F5344CB8AC3E}">
+        <p14:creationId xmlns:p14="http://schemas.microsoft.com/office/powerpoint/2010/main" val="1584771870"/>
       </p:ext>
     </p:extLst>
   </p:cSld>

</xml_diff>